<commit_message>
1 hr before start
</commit_message>
<xml_diff>
--- a/images/Presentatie1.pptx
+++ b/images/Presentatie1.pptx
@@ -11,6 +11,8 @@
     <p:sldId id="258" r:id="rId5"/>
     <p:sldId id="259" r:id="rId6"/>
     <p:sldId id="261" r:id="rId7"/>
+    <p:sldId id="262" r:id="rId8"/>
+    <p:sldId id="263" r:id="rId9"/>
   </p:sldIdLst>
   <p:sldSz cx="12192000" cy="6858000"/>
   <p:notesSz cx="6858000" cy="9144000"/>
@@ -126,6 +128,18 @@
     </p:ext>
   </p:extLst>
 </p:presentation>
+</file>
+
+<file path=ppt/commentAuthors.xml><?xml version="1.0" encoding="utf-8"?>
+<p:cmAuthorLst xmlns:a="http://schemas.openxmlformats.org/drawingml/2006/main" xmlns:r="http://schemas.openxmlformats.org/officeDocument/2006/relationships" xmlns:p="http://schemas.openxmlformats.org/presentationml/2006/main">
+  <p:cmAuthor id="1" name="marc teunis" initials="mt" lastIdx="1" clrIdx="0">
+    <p:extLst>
+      <p:ext uri="{19B8F6BF-5375-455C-9EA6-DF929625EA0E}">
+        <p15:presenceInfo xmlns:p15="http://schemas.microsoft.com/office/powerpoint/2012/main" userId="8fefe675231ec40a" providerId="Windows Live"/>
+      </p:ext>
+    </p:extLst>
+  </p:cmAuthor>
+</p:cmAuthorLst>
 </file>
 
 <file path=ppt/slideLayouts/slideLayout1.xml><?xml version="1.0" encoding="utf-8"?>
@@ -4166,6 +4180,568 @@
 </p:sld>
 </file>
 
+<file path=ppt/slides/slide7.xml><?xml version="1.0" encoding="utf-8"?>
+<p:sld xmlns:a="http://schemas.openxmlformats.org/drawingml/2006/main" xmlns:r="http://schemas.openxmlformats.org/officeDocument/2006/relationships" xmlns:p="http://schemas.openxmlformats.org/presentationml/2006/main">
+  <p:cSld>
+    <p:spTree>
+      <p:nvGrpSpPr>
+        <p:cNvPr id="1" name=""/>
+        <p:cNvGrpSpPr/>
+        <p:nvPr/>
+      </p:nvGrpSpPr>
+      <p:grpSpPr>
+        <a:xfrm>
+          <a:off x="0" y="0"/>
+          <a:ext cx="0" cy="0"/>
+          <a:chOff x="0" y="0"/>
+          <a:chExt cx="0" cy="0"/>
+        </a:xfrm>
+      </p:grpSpPr>
+      <p:sp>
+        <p:nvSpPr>
+          <p:cNvPr id="2" name="Titel 1">
+            <a:extLst>
+              <a:ext uri="{FF2B5EF4-FFF2-40B4-BE49-F238E27FC236}">
+                <a16:creationId xmlns:a16="http://schemas.microsoft.com/office/drawing/2014/main" id="{C95DBDDD-E92F-4C85-A5C6-4706D46ADC39}"/>
+              </a:ext>
+            </a:extLst>
+          </p:cNvPr>
+          <p:cNvSpPr>
+            <a:spLocks noGrp="1"/>
+          </p:cNvSpPr>
+          <p:nvPr>
+            <p:ph type="title"/>
+          </p:nvPr>
+        </p:nvSpPr>
+        <p:spPr/>
+        <p:txBody>
+          <a:bodyPr/>
+          <a:lstStyle/>
+          <a:p>
+            <a:endParaRPr lang="en-US"/>
+          </a:p>
+        </p:txBody>
+      </p:sp>
+      <p:pic>
+        <p:nvPicPr>
+          <p:cNvPr id="6" name="Tijdelijke aanduiding voor inhoud 5" descr="Afbeelding met tekening&#10;&#10;Automatisch gegenereerde beschrijving">
+            <a:extLst>
+              <a:ext uri="{FF2B5EF4-FFF2-40B4-BE49-F238E27FC236}">
+                <a16:creationId xmlns:a16="http://schemas.microsoft.com/office/drawing/2014/main" id="{D9B1177D-9EF4-487E-932F-EBC4F5C96BA3}"/>
+              </a:ext>
+            </a:extLst>
+          </p:cNvPr>
+          <p:cNvPicPr>
+            <a:picLocks noGrp="1" noChangeAspect="1"/>
+          </p:cNvPicPr>
+          <p:nvPr>
+            <p:ph idx="1"/>
+          </p:nvPr>
+        </p:nvPicPr>
+        <p:blipFill>
+          <a:blip r:embed="rId2">
+            <a:extLst>
+              <a:ext uri="{28A0092B-C50C-407E-A947-70E740481C1C}">
+                <a14:useLocalDpi xmlns:a14="http://schemas.microsoft.com/office/drawing/2010/main" val="0"/>
+              </a:ext>
+            </a:extLst>
+          </a:blip>
+          <a:stretch>
+            <a:fillRect/>
+          </a:stretch>
+        </p:blipFill>
+        <p:spPr>
+          <a:xfrm>
+            <a:off x="173311" y="-1"/>
+            <a:ext cx="12000215" cy="6750121"/>
+          </a:xfrm>
+        </p:spPr>
+      </p:pic>
+    </p:spTree>
+    <p:extLst>
+      <p:ext uri="{BB962C8B-B14F-4D97-AF65-F5344CB8AC3E}">
+        <p14:creationId xmlns:p14="http://schemas.microsoft.com/office/powerpoint/2010/main" val="1205076464"/>
+      </p:ext>
+    </p:extLst>
+  </p:cSld>
+  <p:clrMapOvr>
+    <a:masterClrMapping/>
+  </p:clrMapOvr>
+</p:sld>
+</file>
+
+<file path=ppt/slides/slide8.xml><?xml version="1.0" encoding="utf-8"?>
+<p:sld xmlns:a="http://schemas.openxmlformats.org/drawingml/2006/main" xmlns:r="http://schemas.openxmlformats.org/officeDocument/2006/relationships" xmlns:p="http://schemas.openxmlformats.org/presentationml/2006/main">
+  <p:cSld>
+    <p:spTree>
+      <p:nvGrpSpPr>
+        <p:cNvPr id="1" name=""/>
+        <p:cNvGrpSpPr/>
+        <p:nvPr/>
+      </p:nvGrpSpPr>
+      <p:grpSpPr>
+        <a:xfrm>
+          <a:off x="0" y="0"/>
+          <a:ext cx="0" cy="0"/>
+          <a:chOff x="0" y="0"/>
+          <a:chExt cx="0" cy="0"/>
+        </a:xfrm>
+      </p:grpSpPr>
+      <p:sp>
+        <p:nvSpPr>
+          <p:cNvPr id="2" name="Titel 1">
+            <a:extLst>
+              <a:ext uri="{FF2B5EF4-FFF2-40B4-BE49-F238E27FC236}">
+                <a16:creationId xmlns:a16="http://schemas.microsoft.com/office/drawing/2014/main" id="{4E30C8FF-6A5E-4688-BC28-6F96F3C10DBB}"/>
+              </a:ext>
+            </a:extLst>
+          </p:cNvPr>
+          <p:cNvSpPr>
+            <a:spLocks noGrp="1"/>
+          </p:cNvSpPr>
+          <p:nvPr>
+            <p:ph type="title"/>
+          </p:nvPr>
+        </p:nvSpPr>
+        <p:spPr>
+          <a:xfrm>
+            <a:off x="876300" y="-206375"/>
+            <a:ext cx="10515600" cy="1325563"/>
+          </a:xfrm>
+        </p:spPr>
+        <p:txBody>
+          <a:bodyPr/>
+          <a:lstStyle/>
+          <a:p>
+            <a:r>
+              <a:rPr lang="en-US" dirty="0"/>
+              <a:t>Connecting data &amp; methods to conclusions</a:t>
+            </a:r>
+          </a:p>
+        </p:txBody>
+      </p:sp>
+      <p:grpSp>
+        <p:nvGrpSpPr>
+          <p:cNvPr id="8" name="Groep 7">
+            <a:extLst>
+              <a:ext uri="{FF2B5EF4-FFF2-40B4-BE49-F238E27FC236}">
+                <a16:creationId xmlns:a16="http://schemas.microsoft.com/office/drawing/2014/main" id="{9ED802C2-A8DB-4D87-BC22-72B2BF7101FE}"/>
+              </a:ext>
+            </a:extLst>
+          </p:cNvPr>
+          <p:cNvGrpSpPr/>
+          <p:nvPr/>
+        </p:nvGrpSpPr>
+        <p:grpSpPr>
+          <a:xfrm>
+            <a:off x="623299" y="811064"/>
+            <a:ext cx="3733589" cy="2617936"/>
+            <a:chOff x="1090024" y="2000101"/>
+            <a:chExt cx="3733589" cy="2617936"/>
+          </a:xfrm>
+        </p:grpSpPr>
+        <p:pic>
+          <p:nvPicPr>
+            <p:cNvPr id="4" name="Afbeelding 3">
+              <a:extLst>
+                <a:ext uri="{FF2B5EF4-FFF2-40B4-BE49-F238E27FC236}">
+                  <a16:creationId xmlns:a16="http://schemas.microsoft.com/office/drawing/2014/main" id="{09F4BB7B-A522-4C00-990A-8978CB23ED96}"/>
+                </a:ext>
+              </a:extLst>
+            </p:cNvPr>
+            <p:cNvPicPr>
+              <a:picLocks noChangeAspect="1"/>
+            </p:cNvPicPr>
+            <p:nvPr/>
+          </p:nvPicPr>
+          <p:blipFill rotWithShape="1">
+            <a:blip r:embed="rId2"/>
+            <a:srcRect t="2434" r="50618" b="5281"/>
+            <a:stretch/>
+          </p:blipFill>
+          <p:spPr>
+            <a:xfrm>
+              <a:off x="1090024" y="2655673"/>
+              <a:ext cx="3733589" cy="1962364"/>
+            </a:xfrm>
+            <a:prstGeom prst="rect">
+              <a:avLst/>
+            </a:prstGeom>
+          </p:spPr>
+        </p:pic>
+        <p:pic>
+          <p:nvPicPr>
+            <p:cNvPr id="6" name="Afbeelding 5">
+              <a:extLst>
+                <a:ext uri="{FF2B5EF4-FFF2-40B4-BE49-F238E27FC236}">
+                  <a16:creationId xmlns:a16="http://schemas.microsoft.com/office/drawing/2014/main" id="{548E0039-440F-48D7-8EBC-507A1F2C68FC}"/>
+                </a:ext>
+              </a:extLst>
+            </p:cNvPr>
+            <p:cNvPicPr>
+              <a:picLocks noChangeAspect="1"/>
+            </p:cNvPicPr>
+            <p:nvPr/>
+          </p:nvPicPr>
+          <p:blipFill>
+            <a:blip r:embed="rId3">
+              <a:extLst>
+                <a:ext uri="{28A0092B-C50C-407E-A947-70E740481C1C}">
+                  <a14:useLocalDpi xmlns:a14="http://schemas.microsoft.com/office/drawing/2010/main" val="0"/>
+                </a:ext>
+              </a:extLst>
+            </a:blip>
+            <a:stretch>
+              <a:fillRect/>
+            </a:stretch>
+          </p:blipFill>
+          <p:spPr>
+            <a:xfrm>
+              <a:off x="1137649" y="2000101"/>
+              <a:ext cx="1180030" cy="655572"/>
+            </a:xfrm>
+            <a:prstGeom prst="rect">
+              <a:avLst/>
+            </a:prstGeom>
+          </p:spPr>
+        </p:pic>
+      </p:grpSp>
+      <p:sp>
+        <p:nvSpPr>
+          <p:cNvPr id="7" name="Pijl: links/rechts 6">
+            <a:extLst>
+              <a:ext uri="{FF2B5EF4-FFF2-40B4-BE49-F238E27FC236}">
+                <a16:creationId xmlns:a16="http://schemas.microsoft.com/office/drawing/2014/main" id="{292E8392-A826-4669-91BA-3F110A2441D0}"/>
+              </a:ext>
+            </a:extLst>
+          </p:cNvPr>
+          <p:cNvSpPr/>
+          <p:nvPr/>
+        </p:nvSpPr>
+        <p:spPr>
+          <a:xfrm>
+            <a:off x="4649163" y="1679556"/>
+            <a:ext cx="3109324" cy="852755"/>
+          </a:xfrm>
+          <a:prstGeom prst="leftRightArrow">
+            <a:avLst/>
+          </a:prstGeom>
+        </p:spPr>
+        <p:style>
+          <a:lnRef idx="2">
+            <a:schemeClr val="accent1">
+              <a:shade val="50000"/>
+            </a:schemeClr>
+          </a:lnRef>
+          <a:fillRef idx="1">
+            <a:schemeClr val="accent1"/>
+          </a:fillRef>
+          <a:effectRef idx="0">
+            <a:schemeClr val="accent1"/>
+          </a:effectRef>
+          <a:fontRef idx="minor">
+            <a:schemeClr val="lt1"/>
+          </a:fontRef>
+        </p:style>
+        <p:txBody>
+          <a:bodyPr rtlCol="0" anchor="ctr"/>
+          <a:lstStyle/>
+          <a:p>
+            <a:pPr algn="ctr"/>
+            <a:endParaRPr lang="en-US"/>
+          </a:p>
+        </p:txBody>
+      </p:sp>
+      <p:sp>
+        <p:nvSpPr>
+          <p:cNvPr id="9" name="Tekstvak 8">
+            <a:extLst>
+              <a:ext uri="{FF2B5EF4-FFF2-40B4-BE49-F238E27FC236}">
+                <a16:creationId xmlns:a16="http://schemas.microsoft.com/office/drawing/2014/main" id="{78838A21-BD6F-483A-B565-0FB9D04E9532}"/>
+              </a:ext>
+            </a:extLst>
+          </p:cNvPr>
+          <p:cNvSpPr txBox="1"/>
+          <p:nvPr/>
+        </p:nvSpPr>
+        <p:spPr>
+          <a:xfrm>
+            <a:off x="538041" y="3445528"/>
+            <a:ext cx="2365135" cy="369332"/>
+          </a:xfrm>
+          <a:prstGeom prst="rect">
+            <a:avLst/>
+          </a:prstGeom>
+          <a:noFill/>
+        </p:spPr>
+        <p:txBody>
+          <a:bodyPr wrap="none" rtlCol="0">
+            <a:spAutoFit/>
+          </a:bodyPr>
+          <a:lstStyle/>
+          <a:p>
+            <a:r>
+              <a:rPr lang="en-US" dirty="0"/>
+              <a:t>Methods + Conclusions</a:t>
+            </a:r>
+          </a:p>
+        </p:txBody>
+      </p:sp>
+      <p:pic>
+        <p:nvPicPr>
+          <p:cNvPr id="11" name="Afbeelding 10" descr="Afbeelding met bord&#10;&#10;Automatisch gegenereerde beschrijving">
+            <a:extLst>
+              <a:ext uri="{FF2B5EF4-FFF2-40B4-BE49-F238E27FC236}">
+                <a16:creationId xmlns:a16="http://schemas.microsoft.com/office/drawing/2014/main" id="{798FAF02-792E-4AE4-8878-68B5866DA384}"/>
+              </a:ext>
+            </a:extLst>
+          </p:cNvPr>
+          <p:cNvPicPr>
+            <a:picLocks noChangeAspect="1"/>
+          </p:cNvPicPr>
+          <p:nvPr/>
+        </p:nvPicPr>
+        <p:blipFill>
+          <a:blip r:embed="rId4">
+            <a:extLst>
+              <a:ext uri="{28A0092B-C50C-407E-A947-70E740481C1C}">
+                <a14:useLocalDpi xmlns:a14="http://schemas.microsoft.com/office/drawing/2010/main" val="0"/>
+              </a:ext>
+            </a:extLst>
+          </a:blip>
+          <a:stretch>
+            <a:fillRect/>
+          </a:stretch>
+        </p:blipFill>
+        <p:spPr>
+          <a:xfrm>
+            <a:off x="8004658" y="1141721"/>
+            <a:ext cx="1834667" cy="1656934"/>
+          </a:xfrm>
+          <a:prstGeom prst="rect">
+            <a:avLst/>
+          </a:prstGeom>
+        </p:spPr>
+      </p:pic>
+      <p:pic>
+        <p:nvPicPr>
+          <p:cNvPr id="13" name="Afbeelding 12" descr="Afbeelding met tekening, tafel, kop, licht&#10;&#10;Automatisch gegenereerde beschrijving">
+            <a:extLst>
+              <a:ext uri="{FF2B5EF4-FFF2-40B4-BE49-F238E27FC236}">
+                <a16:creationId xmlns:a16="http://schemas.microsoft.com/office/drawing/2014/main" id="{B2DC4E5F-ADED-4DE0-A89B-84DC55CC61FC}"/>
+              </a:ext>
+            </a:extLst>
+          </p:cNvPr>
+          <p:cNvPicPr>
+            <a:picLocks noChangeAspect="1"/>
+          </p:cNvPicPr>
+          <p:nvPr/>
+        </p:nvPicPr>
+        <p:blipFill>
+          <a:blip r:embed="rId5">
+            <a:extLst>
+              <a:ext uri="{28A0092B-C50C-407E-A947-70E740481C1C}">
+                <a14:useLocalDpi xmlns:a14="http://schemas.microsoft.com/office/drawing/2010/main" val="0"/>
+              </a:ext>
+            </a:extLst>
+          </a:blip>
+          <a:stretch>
+            <a:fillRect/>
+          </a:stretch>
+        </p:blipFill>
+        <p:spPr>
+          <a:xfrm>
+            <a:off x="5560081" y="4856125"/>
+            <a:ext cx="1800225" cy="1800225"/>
+          </a:xfrm>
+          <a:prstGeom prst="rect">
+            <a:avLst/>
+          </a:prstGeom>
+        </p:spPr>
+      </p:pic>
+      <p:sp>
+        <p:nvSpPr>
+          <p:cNvPr id="15" name="Pijl: links/rechts 14">
+            <a:extLst>
+              <a:ext uri="{FF2B5EF4-FFF2-40B4-BE49-F238E27FC236}">
+                <a16:creationId xmlns:a16="http://schemas.microsoft.com/office/drawing/2014/main" id="{5F93BE36-B7F8-493A-9218-AB9D31833BD0}"/>
+              </a:ext>
+            </a:extLst>
+          </p:cNvPr>
+          <p:cNvSpPr/>
+          <p:nvPr/>
+        </p:nvSpPr>
+        <p:spPr>
+          <a:xfrm rot="2900107">
+            <a:off x="3412428" y="3817126"/>
+            <a:ext cx="3109324" cy="852755"/>
+          </a:xfrm>
+          <a:prstGeom prst="leftRightArrow">
+            <a:avLst/>
+          </a:prstGeom>
+        </p:spPr>
+        <p:style>
+          <a:lnRef idx="2">
+            <a:schemeClr val="accent1">
+              <a:shade val="50000"/>
+            </a:schemeClr>
+          </a:lnRef>
+          <a:fillRef idx="1">
+            <a:schemeClr val="accent1"/>
+          </a:fillRef>
+          <a:effectRef idx="0">
+            <a:schemeClr val="accent1"/>
+          </a:effectRef>
+          <a:fontRef idx="minor">
+            <a:schemeClr val="lt1"/>
+          </a:fontRef>
+        </p:style>
+        <p:txBody>
+          <a:bodyPr rtlCol="0" anchor="ctr"/>
+          <a:lstStyle/>
+          <a:p>
+            <a:pPr algn="ctr"/>
+            <a:endParaRPr lang="en-US"/>
+          </a:p>
+        </p:txBody>
+      </p:sp>
+      <p:sp>
+        <p:nvSpPr>
+          <p:cNvPr id="16" name="Pijl: links/rechts 15">
+            <a:extLst>
+              <a:ext uri="{FF2B5EF4-FFF2-40B4-BE49-F238E27FC236}">
+                <a16:creationId xmlns:a16="http://schemas.microsoft.com/office/drawing/2014/main" id="{33F5F731-0828-4791-B863-22E4B9323D20}"/>
+              </a:ext>
+            </a:extLst>
+          </p:cNvPr>
+          <p:cNvSpPr/>
+          <p:nvPr/>
+        </p:nvSpPr>
+        <p:spPr>
+          <a:xfrm rot="7738770">
+            <a:off x="6424760" y="3755410"/>
+            <a:ext cx="3109324" cy="852755"/>
+          </a:xfrm>
+          <a:prstGeom prst="leftRightArrow">
+            <a:avLst/>
+          </a:prstGeom>
+        </p:spPr>
+        <p:style>
+          <a:lnRef idx="2">
+            <a:schemeClr val="accent1">
+              <a:shade val="50000"/>
+            </a:schemeClr>
+          </a:lnRef>
+          <a:fillRef idx="1">
+            <a:schemeClr val="accent1"/>
+          </a:fillRef>
+          <a:effectRef idx="0">
+            <a:schemeClr val="accent1"/>
+          </a:effectRef>
+          <a:fontRef idx="minor">
+            <a:schemeClr val="lt1"/>
+          </a:fontRef>
+        </p:style>
+        <p:txBody>
+          <a:bodyPr rtlCol="0" anchor="ctr"/>
+          <a:lstStyle/>
+          <a:p>
+            <a:pPr algn="ctr"/>
+            <a:endParaRPr lang="en-US"/>
+          </a:p>
+        </p:txBody>
+      </p:sp>
+      <p:sp>
+        <p:nvSpPr>
+          <p:cNvPr id="17" name="Tekstvak 16">
+            <a:extLst>
+              <a:ext uri="{FF2B5EF4-FFF2-40B4-BE49-F238E27FC236}">
+                <a16:creationId xmlns:a16="http://schemas.microsoft.com/office/drawing/2014/main" id="{C546FD8B-47CB-4402-B3CC-E2C560694580}"/>
+              </a:ext>
+            </a:extLst>
+          </p:cNvPr>
+          <p:cNvSpPr txBox="1"/>
+          <p:nvPr/>
+        </p:nvSpPr>
+        <p:spPr>
+          <a:xfrm>
+            <a:off x="3474106" y="6045853"/>
+            <a:ext cx="2728439" cy="369332"/>
+          </a:xfrm>
+          <a:prstGeom prst="rect">
+            <a:avLst/>
+          </a:prstGeom>
+          <a:noFill/>
+        </p:spPr>
+        <p:txBody>
+          <a:bodyPr wrap="none" rtlCol="0">
+            <a:spAutoFit/>
+          </a:bodyPr>
+          <a:lstStyle/>
+          <a:p>
+            <a:r>
+              <a:rPr lang="en-US" dirty="0"/>
+              <a:t>Data (in HU </a:t>
+            </a:r>
+            <a:r>
+              <a:rPr lang="en-US" dirty="0" err="1"/>
+              <a:t>ResearchDrive</a:t>
+            </a:r>
+            <a:r>
+              <a:rPr lang="en-US" dirty="0"/>
+              <a:t>)</a:t>
+            </a:r>
+          </a:p>
+        </p:txBody>
+      </p:sp>
+      <p:sp>
+        <p:nvSpPr>
+          <p:cNvPr id="18" name="Tekstvak 17">
+            <a:extLst>
+              <a:ext uri="{FF2B5EF4-FFF2-40B4-BE49-F238E27FC236}">
+                <a16:creationId xmlns:a16="http://schemas.microsoft.com/office/drawing/2014/main" id="{9E557B48-BB43-4897-9886-02CEE21DE295}"/>
+              </a:ext>
+            </a:extLst>
+          </p:cNvPr>
+          <p:cNvSpPr txBox="1"/>
+          <p:nvPr/>
+        </p:nvSpPr>
+        <p:spPr>
+          <a:xfrm>
+            <a:off x="9098184" y="2971372"/>
+            <a:ext cx="2523255" cy="369332"/>
+          </a:xfrm>
+          <a:prstGeom prst="rect">
+            <a:avLst/>
+          </a:prstGeom>
+          <a:noFill/>
+        </p:spPr>
+        <p:txBody>
+          <a:bodyPr wrap="none" rtlCol="0">
+            <a:spAutoFit/>
+          </a:bodyPr>
+          <a:lstStyle/>
+          <a:p>
+            <a:r>
+              <a:rPr lang="en-US" dirty="0"/>
+              <a:t>Scripts / Code / Software</a:t>
+            </a:r>
+          </a:p>
+        </p:txBody>
+      </p:sp>
+    </p:spTree>
+    <p:extLst>
+      <p:ext uri="{BB962C8B-B14F-4D97-AF65-F5344CB8AC3E}">
+        <p14:creationId xmlns:p14="http://schemas.microsoft.com/office/powerpoint/2010/main" val="1719384755"/>
+      </p:ext>
+    </p:extLst>
+  </p:cSld>
+  <p:clrMapOvr>
+    <a:masterClrMapping/>
+  </p:clrMapOvr>
+</p:sld>
+</file>
+
 <file path=ppt/theme/theme1.xml><?xml version="1.0" encoding="utf-8"?>
 <a:theme xmlns:a="http://schemas.openxmlformats.org/drawingml/2006/main" name="Kantoorthema">
   <a:themeElements>

</xml_diff>